<commit_message>
Docs & Powerpoint Update
</commit_message>
<xml_diff>
--- a/docs/FuzzyRecordLinkage.pptx
+++ b/docs/FuzzyRecordLinkage.pptx
@@ -10,8 +10,8 @@
   <p:sldIdLst>
     <p:sldId id="256" r:id="rId2"/>
     <p:sldId id="257" r:id="rId3"/>
-    <p:sldId id="278" r:id="rId4"/>
-    <p:sldId id="281" r:id="rId5"/>
+    <p:sldId id="281" r:id="rId4"/>
+    <p:sldId id="278" r:id="rId5"/>
     <p:sldId id="258" r:id="rId6"/>
     <p:sldId id="259" r:id="rId7"/>
     <p:sldId id="260" r:id="rId8"/>
@@ -13759,7 +13759,7 @@
 <dgm:dataModel xmlns:dgm="http://schemas.openxmlformats.org/drawingml/2006/diagram" xmlns:a="http://schemas.openxmlformats.org/drawingml/2006/main">
   <dgm:ptLst>
     <dgm:pt modelId="{50AB081A-7CA7-4F55-862D-B5483B96FD53}" type="doc">
-      <dgm:prSet loTypeId="urn:microsoft.com/office/officeart/2005/8/layout/vList5" loCatId="list" qsTypeId="urn:microsoft.com/office/officeart/2005/8/quickstyle/simple4" qsCatId="simple" csTypeId="urn:microsoft.com/office/officeart/2005/8/colors/colorful2" csCatId="colorful"/>
+      <dgm:prSet loTypeId="urn:microsoft.com/office/officeart/2005/8/layout/vList5" loCatId="list" qsTypeId="urn:microsoft.com/office/officeart/2005/8/quickstyle/simple4" qsCatId="simple" csTypeId="urn:microsoft.com/office/officeart/2005/8/colors/colorful2" csCatId="colorful" phldr="1"/>
       <dgm:spPr/>
       <dgm:t>
         <a:bodyPr/>
@@ -13849,8 +13849,8 @@
         <a:lstStyle/>
         <a:p>
           <a:r>
-            <a:rPr lang="en-US"/>
-            <a:t>Count how known matches we identified</a:t>
+            <a:rPr lang="en-US" dirty="0"/>
+            <a:t>Count how many matches we identified</a:t>
           </a:r>
         </a:p>
       </dgm:t>
@@ -14302,7 +14302,7 @@
         <a:lstStyle/>
         <a:p>
           <a:r>
-            <a:rPr lang="en-US"/>
+            <a:rPr lang="en-US" dirty="0"/>
             <a:t>Apache's Commons-Codec Library</a:t>
           </a:r>
         </a:p>
@@ -14429,10 +14429,100 @@
     <dgm:pt modelId="{0C7148DF-BA08-40BF-B513-4E1515C46C9D}" type="parTrans" cxnId="{2E39548D-7ECF-472E-A6F7-8FE6F1E7E9DF}">
       <dgm:prSet/>
       <dgm:spPr/>
+      <dgm:t>
+        <a:bodyPr/>
+        <a:lstStyle/>
+        <a:p>
+          <a:endParaRPr lang="en-US"/>
+        </a:p>
+      </dgm:t>
     </dgm:pt>
     <dgm:pt modelId="{91172A2A-45E4-4302-A342-B6542289DEE9}" type="sibTrans" cxnId="{2E39548D-7ECF-472E-A6F7-8FE6F1E7E9DF}">
       <dgm:prSet/>
       <dgm:spPr/>
+      <dgm:t>
+        <a:bodyPr/>
+        <a:lstStyle/>
+        <a:p>
+          <a:endParaRPr lang="en-US"/>
+        </a:p>
+      </dgm:t>
+    </dgm:pt>
+    <dgm:pt modelId="{2691C195-9B3E-4A05-B9E1-0B89D5173DA2}">
+      <dgm:prSet/>
+      <dgm:spPr/>
+      <dgm:t>
+        <a:bodyPr/>
+        <a:lstStyle/>
+        <a:p>
+          <a:r>
+            <a:rPr lang="en-US" dirty="0"/>
+            <a:t>Ex.</a:t>
+          </a:r>
+        </a:p>
+      </dgm:t>
+    </dgm:pt>
+    <dgm:pt modelId="{244093C5-410D-49CE-9090-AAC1BEF5167F}" type="parTrans" cxnId="{10B420B6-AC38-4392-B5B1-A690AC73EFF0}">
+      <dgm:prSet/>
+      <dgm:spPr/>
+      <dgm:t>
+        <a:bodyPr/>
+        <a:lstStyle/>
+        <a:p>
+          <a:endParaRPr lang="en-US"/>
+        </a:p>
+      </dgm:t>
+    </dgm:pt>
+    <dgm:pt modelId="{6F4CF80E-AAE2-4BF6-9DCC-D2B69376F092}" type="sibTrans" cxnId="{10B420B6-AC38-4392-B5B1-A690AC73EFF0}">
+      <dgm:prSet/>
+      <dgm:spPr/>
+      <dgm:t>
+        <a:bodyPr/>
+        <a:lstStyle/>
+        <a:p>
+          <a:endParaRPr lang="en-US"/>
+        </a:p>
+      </dgm:t>
+    </dgm:pt>
+    <dgm:pt modelId="{7ABB3B96-74F0-4924-AEC0-168568348B49}">
+      <dgm:prSet/>
+      <dgm:spPr/>
+      <dgm:t>
+        <a:bodyPr/>
+        <a:lstStyle/>
+        <a:p>
+          <a:r>
+            <a:rPr lang="en-US" dirty="0" err="1"/>
+            <a:t>Illesca</a:t>
+          </a:r>
+          <a:r>
+            <a:rPr lang="en-US" dirty="0"/>
+            <a:t> -&gt; ILSK</a:t>
+          </a:r>
+        </a:p>
+      </dgm:t>
+    </dgm:pt>
+    <dgm:pt modelId="{C1B394C4-3B5B-4D89-AFD4-EE29C392C296}" type="parTrans" cxnId="{5630843D-D069-4CFC-88A5-8B5905CD1276}">
+      <dgm:prSet/>
+      <dgm:spPr/>
+      <dgm:t>
+        <a:bodyPr/>
+        <a:lstStyle/>
+        <a:p>
+          <a:endParaRPr lang="en-US"/>
+        </a:p>
+      </dgm:t>
+    </dgm:pt>
+    <dgm:pt modelId="{718313B8-75E2-4E8C-A27E-6EA9DAD009B3}" type="sibTrans" cxnId="{5630843D-D069-4CFC-88A5-8B5905CD1276}">
+      <dgm:prSet/>
+      <dgm:spPr/>
+      <dgm:t>
+        <a:bodyPr/>
+        <a:lstStyle/>
+        <a:p>
+          <a:endParaRPr lang="en-US"/>
+        </a:p>
+      </dgm:t>
     </dgm:pt>
     <dgm:pt modelId="{3AE4E8EB-BFAC-4B8C-A3D0-FACA322E6019}" type="pres">
       <dgm:prSet presAssocID="{5BEABEE3-1727-4455-A650-02F8062F1DB2}" presName="Name0" presStyleCnt="0">
@@ -14522,15 +14612,19 @@
   <dgm:cxnLst>
     <dgm:cxn modelId="{7D715A04-AE56-4C2C-8776-38FCD72CC8A7}" srcId="{9BB12580-585C-4D0B-A189-1D1CC59F132E}" destId="{519D55AD-DA6A-4D92-9BAE-1EC431A17F1F}" srcOrd="0" destOrd="0" parTransId="{CC73AD7A-4713-4BBF-AF5B-CFFBFAFAE1D3}" sibTransId="{FABC6BD2-66CF-4CF7-BBDF-9CACCC63B657}"/>
     <dgm:cxn modelId="{B11AAD26-BDF7-480B-82B6-B5A21D773C19}" srcId="{5BEABEE3-1727-4455-A650-02F8062F1DB2}" destId="{733C7CDF-D79C-4997-AE7C-0AA115E9B37D}" srcOrd="1" destOrd="0" parTransId="{876DAFC0-1E1B-4003-A119-F62A87E007AA}" sibTransId="{193819F3-3CEF-4150-9338-7E70F85A58E0}"/>
+    <dgm:cxn modelId="{5630843D-D069-4CFC-88A5-8B5905CD1276}" srcId="{2691C195-9B3E-4A05-B9E1-0B89D5173DA2}" destId="{7ABB3B96-74F0-4924-AEC0-168568348B49}" srcOrd="0" destOrd="0" parTransId="{C1B394C4-3B5B-4D89-AFD4-EE29C392C296}" sibTransId="{718313B8-75E2-4E8C-A27E-6EA9DAD009B3}"/>
     <dgm:cxn modelId="{3CAA1342-CD84-461B-ADA2-59907A698CCD}" srcId="{5BEABEE3-1727-4455-A650-02F8062F1DB2}" destId="{1D2EDD16-77B5-4180-9186-7D04A2E0FDE9}" srcOrd="2" destOrd="0" parTransId="{1D6D448F-D28C-4B9A-BDB6-435CBF659AB0}" sibTransId="{51335CE9-5EDD-45AE-A69A-0AE33CB10A57}"/>
+    <dgm:cxn modelId="{E5BFF645-00DD-4013-AC03-61EA7189D550}" type="presOf" srcId="{7ABB3B96-74F0-4924-AEC0-168568348B49}" destId="{5ADA738D-7366-4CF7-9EEF-48BD3EE37EB5}" srcOrd="0" destOrd="2" presId="urn:microsoft.com/office/officeart/2005/8/layout/hList1"/>
     <dgm:cxn modelId="{62D28370-4929-4A91-9044-119CA2813E27}" type="presOf" srcId="{5BEABEE3-1727-4455-A650-02F8062F1DB2}" destId="{3AE4E8EB-BFAC-4B8C-A3D0-FACA322E6019}" srcOrd="0" destOrd="0" presId="urn:microsoft.com/office/officeart/2005/8/layout/hList1"/>
     <dgm:cxn modelId="{C681A575-FAAF-4CE1-A146-C5DB7848240A}" type="presOf" srcId="{9BB12580-585C-4D0B-A189-1D1CC59F132E}" destId="{5150A35B-B304-4C3C-8BCE-ADFEFE63D401}" srcOrd="0" destOrd="0" presId="urn:microsoft.com/office/officeart/2005/8/layout/hList1"/>
+    <dgm:cxn modelId="{FA4D1559-D532-4D17-A605-8D63819D0C0B}" type="presOf" srcId="{2691C195-9B3E-4A05-B9E1-0B89D5173DA2}" destId="{5ADA738D-7366-4CF7-9EEF-48BD3EE37EB5}" srcOrd="0" destOrd="1" presId="urn:microsoft.com/office/officeart/2005/8/layout/hList1"/>
     <dgm:cxn modelId="{4930447E-EC40-461E-A27E-970726E6EF84}" type="presOf" srcId="{B5321914-0046-4212-B6C1-981A6C5C5BDE}" destId="{52982DCB-31B4-4B9A-9096-43BE6F508B52}" srcOrd="0" destOrd="0" presId="urn:microsoft.com/office/officeart/2005/8/layout/hList1"/>
     <dgm:cxn modelId="{406D4788-EF92-4644-BE5F-5171BFE615B8}" type="presOf" srcId="{519D55AD-DA6A-4D92-9BAE-1EC431A17F1F}" destId="{AD423238-9BB4-400E-8A17-60392CB4CA8A}" srcOrd="0" destOrd="0" presId="urn:microsoft.com/office/officeart/2005/8/layout/hList1"/>
     <dgm:cxn modelId="{2E39548D-7ECF-472E-A6F7-8FE6F1E7E9DF}" srcId="{5BEABEE3-1727-4455-A650-02F8062F1DB2}" destId="{9BB12580-585C-4D0B-A189-1D1CC59F132E}" srcOrd="0" destOrd="0" parTransId="{0C7148DF-BA08-40BF-B513-4E1515C46C9D}" sibTransId="{91172A2A-45E4-4302-A342-B6542289DEE9}"/>
     <dgm:cxn modelId="{27A9538E-F1B7-4FFD-8EB4-B2BA272BE437}" type="presOf" srcId="{733C7CDF-D79C-4997-AE7C-0AA115E9B37D}" destId="{C69EBD1D-33B8-41A3-9F1A-B18E772B4FED}" srcOrd="0" destOrd="0" presId="urn:microsoft.com/office/officeart/2005/8/layout/hList1"/>
     <dgm:cxn modelId="{DEFC6390-12D5-4DE8-BCF0-11D78B797F72}" type="presOf" srcId="{1D2EDD16-77B5-4180-9186-7D04A2E0FDE9}" destId="{57BCF1C9-8773-4798-B4A7-D1ED852BB8F5}" srcOrd="0" destOrd="0" presId="urn:microsoft.com/office/officeart/2005/8/layout/hList1"/>
     <dgm:cxn modelId="{899F2092-2C6D-4856-BE43-9C02A2DC1D0E}" srcId="{1D2EDD16-77B5-4180-9186-7D04A2E0FDE9}" destId="{B5321914-0046-4212-B6C1-981A6C5C5BDE}" srcOrd="0" destOrd="0" parTransId="{911042A3-3BE3-4A65-B5EE-ED8A31CA2D0D}" sibTransId="{4EEAB52D-4CC9-48E9-A6FA-88A7BC22CB53}"/>
+    <dgm:cxn modelId="{10B420B6-AC38-4392-B5B1-A690AC73EFF0}" srcId="{733C7CDF-D79C-4997-AE7C-0AA115E9B37D}" destId="{2691C195-9B3E-4A05-B9E1-0B89D5173DA2}" srcOrd="1" destOrd="0" parTransId="{244093C5-410D-49CE-9090-AAC1BEF5167F}" sibTransId="{6F4CF80E-AAE2-4BF6-9DCC-D2B69376F092}"/>
     <dgm:cxn modelId="{B8DA82C1-5D89-4683-A301-2E59C91A85B8}" type="presOf" srcId="{3CF98947-2C36-4655-B25E-8BA32034AAAD}" destId="{5ADA738D-7366-4CF7-9EEF-48BD3EE37EB5}" srcOrd="0" destOrd="0" presId="urn:microsoft.com/office/officeart/2005/8/layout/hList1"/>
     <dgm:cxn modelId="{853B55D4-3A36-4767-A80F-93B86AF47769}" srcId="{733C7CDF-D79C-4997-AE7C-0AA115E9B37D}" destId="{3CF98947-2C36-4655-B25E-8BA32034AAAD}" srcOrd="0" destOrd="0" parTransId="{4F295F12-F087-4251-AC9C-53DB54E60442}" sibTransId="{04714A32-C2C5-44B9-82BD-A130BF32F053}"/>
     <dgm:cxn modelId="{79375E6B-C48E-4B4E-B41A-F4F4A0AC6D0D}" type="presParOf" srcId="{3AE4E8EB-BFAC-4B8C-A3D0-FACA322E6019}" destId="{7AC12045-90A6-46F5-B7F6-6A583B22754C}" srcOrd="0" destOrd="0" presId="urn:microsoft.com/office/officeart/2005/8/layout/hList1"/>
@@ -15010,8 +15104,8 @@
         <a:lstStyle/>
         <a:p>
           <a:r>
-            <a:rPr lang="en-US"/>
-            <a:t>Simplicity</a:t>
+            <a:rPr lang="en-US" dirty="0"/>
+            <a:t>Simplicity &amp; Flexibility</a:t>
           </a:r>
         </a:p>
       </dgm:t>
@@ -17800,16 +17894,36 @@
         <a:lstStyle/>
         <a:p>
           <a:r>
-            <a:rPr lang="en-US" err="1">
+            <a:rPr lang="en-US" dirty="0" err="1">
               <a:latin typeface="Century Gothic" panose="020B0502020202020204"/>
             </a:rPr>
             <a:t>Levenshtein</a:t>
           </a:r>
           <a:r>
-            <a:rPr lang="en-US">
+            <a:rPr lang="en-US" dirty="0">
               <a:latin typeface="Century Gothic" panose="020B0502020202020204"/>
             </a:rPr>
             <a:t> Distance</a:t>
+          </a:r>
+        </a:p>
+        <a:p>
+          <a:r>
+            <a:rPr lang="en-US" dirty="0">
+              <a:latin typeface="Century Gothic" panose="020B0502020202020204"/>
+            </a:rPr>
+            <a:t>Ex. Axel ~ </a:t>
+          </a:r>
+          <a:r>
+            <a:rPr lang="en-US" dirty="0" err="1">
+              <a:latin typeface="Century Gothic" panose="020B0502020202020204"/>
+            </a:rPr>
+            <a:t>Axl</a:t>
+          </a:r>
+          <a:r>
+            <a:rPr lang="en-US" dirty="0">
+              <a:latin typeface="Century Gothic" panose="020B0502020202020204"/>
+            </a:rPr>
+            <a:t> = 85.7</a:t>
           </a:r>
         </a:p>
       </dgm:t>
@@ -18089,10 +18203,24 @@
     <dgm:pt modelId="{A26CB54A-A138-48E8-B2DC-BE153488A89F}" type="parTrans" cxnId="{639D7E03-A291-4221-A037-B584E6CC4E21}">
       <dgm:prSet/>
       <dgm:spPr/>
+      <dgm:t>
+        <a:bodyPr/>
+        <a:lstStyle/>
+        <a:p>
+          <a:endParaRPr lang="en-US"/>
+        </a:p>
+      </dgm:t>
     </dgm:pt>
     <dgm:pt modelId="{66E70B63-6ED8-489A-8FE3-7A8DFFD1C1FE}" type="sibTrans" cxnId="{639D7E03-A291-4221-A037-B584E6CC4E21}">
       <dgm:prSet/>
       <dgm:spPr/>
+      <dgm:t>
+        <a:bodyPr/>
+        <a:lstStyle/>
+        <a:p>
+          <a:endParaRPr lang="en-US"/>
+        </a:p>
+      </dgm:t>
     </dgm:pt>
     <dgm:pt modelId="{8C660FB0-F113-4893-AEB2-E531D53BC56C}" type="pres">
       <dgm:prSet presAssocID="{A3F3E29B-A89E-493D-943F-76C7AD429A3B}" presName="Name0" presStyleCnt="0">
@@ -19677,8 +19805,8 @@
       </dsp:nvSpPr>
       <dsp:spPr>
         <a:xfrm>
-          <a:off x="3007" y="400114"/>
-          <a:ext cx="2932733" cy="1173093"/>
+          <a:off x="3007" y="429933"/>
+          <a:ext cx="2932733" cy="1157375"/>
         </a:xfrm>
         <a:prstGeom prst="rect">
           <a:avLst/>
@@ -19756,12 +19884,12 @@
         </a:fontRef>
       </dsp:style>
       <dsp:txBody>
-        <a:bodyPr spcFirstLastPara="0" vert="horz" wrap="square" lIns="234696" tIns="134112" rIns="234696" bIns="134112" numCol="1" spcCol="1270" anchor="ctr" anchorCtr="0">
+        <a:bodyPr spcFirstLastPara="0" vert="horz" wrap="square" lIns="227584" tIns="130048" rIns="227584" bIns="130048" numCol="1" spcCol="1270" anchor="ctr" anchorCtr="0">
           <a:noAutofit/>
         </a:bodyPr>
         <a:lstStyle/>
         <a:p>
-          <a:pPr marL="0" lvl="0" indent="0" algn="ctr" defTabSz="1466850">
+          <a:pPr marL="0" lvl="0" indent="0" algn="ctr" defTabSz="1422400">
             <a:lnSpc>
               <a:spcPct val="90000"/>
             </a:lnSpc>
@@ -19774,19 +19902,19 @@
             <a:buNone/>
           </a:pPr>
           <a:r>
-            <a:rPr lang="en-US" sz="3300" b="0" i="0" kern="1200">
+            <a:rPr lang="en-US" sz="3200" b="0" i="0" kern="1200">
               <a:latin typeface="Century Gothic" panose="020B0502020202020204"/>
             </a:rPr>
             <a:t>Non-match </a:t>
           </a:r>
-          <a:endParaRPr lang="en-US" sz="3300" kern="1200">
+          <a:endParaRPr lang="en-US" sz="3200" kern="1200">
             <a:latin typeface="Century Gothic" panose="020B0502020202020204"/>
           </a:endParaRPr>
         </a:p>
       </dsp:txBody>
       <dsp:txXfrm>
-        <a:off x="3007" y="400114"/>
-        <a:ext cx="2932733" cy="1173093"/>
+        <a:off x="3007" y="429933"/>
+        <a:ext cx="2932733" cy="1157375"/>
       </dsp:txXfrm>
     </dsp:sp>
     <dsp:sp modelId="{9C8415EA-9F97-423D-85D6-1361494AF506}">
@@ -19796,8 +19924,8 @@
       </dsp:nvSpPr>
       <dsp:spPr>
         <a:xfrm>
-          <a:off x="3007" y="1573208"/>
-          <a:ext cx="2932733" cy="1449360"/>
+          <a:off x="3007" y="1587309"/>
+          <a:ext cx="2932733" cy="1405440"/>
         </a:xfrm>
         <a:prstGeom prst="rect">
           <a:avLst/>
@@ -19840,12 +19968,12 @@
         <a:fontRef idx="minor"/>
       </dsp:style>
       <dsp:txBody>
-        <a:bodyPr spcFirstLastPara="0" vert="horz" wrap="square" lIns="176022" tIns="176022" rIns="234696" bIns="264033" numCol="1" spcCol="1270" anchor="t" anchorCtr="0">
+        <a:bodyPr spcFirstLastPara="0" vert="horz" wrap="square" lIns="170688" tIns="170688" rIns="227584" bIns="256032" numCol="1" spcCol="1270" anchor="t" anchorCtr="0">
           <a:noAutofit/>
         </a:bodyPr>
         <a:lstStyle/>
         <a:p>
-          <a:pPr marL="285750" lvl="1" indent="-285750" algn="l" defTabSz="1466850">
+          <a:pPr marL="285750" lvl="1" indent="-285750" algn="l" defTabSz="1422400">
             <a:lnSpc>
               <a:spcPct val="90000"/>
             </a:lnSpc>
@@ -19858,19 +19986,19 @@
             <a:buChar char="•"/>
           </a:pPr>
           <a:r>
-            <a:rPr lang="en-US" sz="3300" b="0" i="0" kern="1200">
+            <a:rPr lang="en-US" sz="3200" b="0" i="0" kern="1200">
               <a:latin typeface="Century Gothic"/>
             </a:rPr>
             <a:t>[ 0, 70)</a:t>
           </a:r>
-          <a:endParaRPr lang="en-US" sz="3300" kern="1200">
+          <a:endParaRPr lang="en-US" sz="3200" kern="1200">
             <a:latin typeface="Century Gothic"/>
           </a:endParaRPr>
         </a:p>
       </dsp:txBody>
       <dsp:txXfrm>
-        <a:off x="3007" y="1573208"/>
-        <a:ext cx="2932733" cy="1449360"/>
+        <a:off x="3007" y="1587309"/>
+        <a:ext cx="2932733" cy="1405440"/>
       </dsp:txXfrm>
     </dsp:sp>
     <dsp:sp modelId="{5B6DAA36-6AD9-4290-97AA-8B4D841F7619}">
@@ -19880,8 +20008,8 @@
       </dsp:nvSpPr>
       <dsp:spPr>
         <a:xfrm>
-          <a:off x="3346324" y="400114"/>
-          <a:ext cx="2932733" cy="1173093"/>
+          <a:off x="3346324" y="429933"/>
+          <a:ext cx="2932733" cy="1157375"/>
         </a:xfrm>
         <a:prstGeom prst="rect">
           <a:avLst/>
@@ -19959,12 +20087,12 @@
         </a:fontRef>
       </dsp:style>
       <dsp:txBody>
-        <a:bodyPr spcFirstLastPara="0" vert="horz" wrap="square" lIns="234696" tIns="134112" rIns="234696" bIns="134112" numCol="1" spcCol="1270" anchor="ctr" anchorCtr="0">
+        <a:bodyPr spcFirstLastPara="0" vert="horz" wrap="square" lIns="227584" tIns="130048" rIns="227584" bIns="130048" numCol="1" spcCol="1270" anchor="ctr" anchorCtr="0">
           <a:noAutofit/>
         </a:bodyPr>
         <a:lstStyle/>
         <a:p>
-          <a:pPr marL="0" lvl="0" indent="0" algn="ctr" defTabSz="1466850">
+          <a:pPr marL="0" lvl="0" indent="0" algn="ctr" defTabSz="1422400">
             <a:lnSpc>
               <a:spcPct val="90000"/>
             </a:lnSpc>
@@ -19977,19 +20105,19 @@
             <a:buNone/>
           </a:pPr>
           <a:r>
-            <a:rPr lang="en-US" sz="3300" b="0" i="0" kern="1200">
+            <a:rPr lang="en-US" sz="3200" b="0" i="0" kern="1200">
               <a:latin typeface="Century Gothic"/>
             </a:rPr>
             <a:t>Potential Match</a:t>
           </a:r>
-          <a:endParaRPr lang="en-US" sz="3300" kern="1200">
+          <a:endParaRPr lang="en-US" sz="3200" kern="1200">
             <a:latin typeface="Century Gothic"/>
           </a:endParaRPr>
         </a:p>
       </dsp:txBody>
       <dsp:txXfrm>
-        <a:off x="3346324" y="400114"/>
-        <a:ext cx="2932733" cy="1173093"/>
+        <a:off x="3346324" y="429933"/>
+        <a:ext cx="2932733" cy="1157375"/>
       </dsp:txXfrm>
     </dsp:sp>
     <dsp:sp modelId="{D49AED09-BD53-4876-9BBC-040D753C6882}">
@@ -19999,8 +20127,8 @@
       </dsp:nvSpPr>
       <dsp:spPr>
         <a:xfrm>
-          <a:off x="3346324" y="1573208"/>
-          <a:ext cx="2932733" cy="1449360"/>
+          <a:off x="3346324" y="1587309"/>
+          <a:ext cx="2932733" cy="1405440"/>
         </a:xfrm>
         <a:prstGeom prst="rect">
           <a:avLst/>
@@ -20043,12 +20171,12 @@
         <a:fontRef idx="minor"/>
       </dsp:style>
       <dsp:txBody>
-        <a:bodyPr spcFirstLastPara="0" vert="horz" wrap="square" lIns="176022" tIns="176022" rIns="234696" bIns="264033" numCol="1" spcCol="1270" anchor="t" anchorCtr="0">
+        <a:bodyPr spcFirstLastPara="0" vert="horz" wrap="square" lIns="170688" tIns="170688" rIns="227584" bIns="256032" numCol="1" spcCol="1270" anchor="t" anchorCtr="0">
           <a:noAutofit/>
         </a:bodyPr>
         <a:lstStyle/>
         <a:p>
-          <a:pPr marL="285750" lvl="1" indent="-285750" algn="l" defTabSz="1466850">
+          <a:pPr marL="285750" lvl="1" indent="-285750" algn="l" defTabSz="1422400">
             <a:lnSpc>
               <a:spcPct val="90000"/>
             </a:lnSpc>
@@ -20061,19 +20189,19 @@
             <a:buChar char="•"/>
           </a:pPr>
           <a:r>
-            <a:rPr lang="en-US" sz="3300" b="0" i="0" kern="1200">
+            <a:rPr lang="en-US" sz="3200" b="0" i="0" kern="1200">
               <a:latin typeface="Century Gothic"/>
             </a:rPr>
             <a:t>[70, 90)</a:t>
           </a:r>
-          <a:endParaRPr lang="en-US" sz="3300" kern="1200">
+          <a:endParaRPr lang="en-US" sz="3200" kern="1200">
             <a:latin typeface="Century Gothic"/>
           </a:endParaRPr>
         </a:p>
       </dsp:txBody>
       <dsp:txXfrm>
-        <a:off x="3346324" y="1573208"/>
-        <a:ext cx="2932733" cy="1449360"/>
+        <a:off x="3346324" y="1587309"/>
+        <a:ext cx="2932733" cy="1405440"/>
       </dsp:txXfrm>
     </dsp:sp>
     <dsp:sp modelId="{7AC0FAFC-06CC-4EA6-BFFE-D92CC0A8CE68}">
@@ -20083,8 +20211,8 @@
       </dsp:nvSpPr>
       <dsp:spPr>
         <a:xfrm>
-          <a:off x="6689641" y="400114"/>
-          <a:ext cx="2932733" cy="1173093"/>
+          <a:off x="6689641" y="429933"/>
+          <a:ext cx="2932733" cy="1157375"/>
         </a:xfrm>
         <a:prstGeom prst="rect">
           <a:avLst/>
@@ -20162,12 +20290,12 @@
         </a:fontRef>
       </dsp:style>
       <dsp:txBody>
-        <a:bodyPr spcFirstLastPara="0" vert="horz" wrap="square" lIns="234696" tIns="134112" rIns="234696" bIns="134112" numCol="1" spcCol="1270" anchor="ctr" anchorCtr="0">
+        <a:bodyPr spcFirstLastPara="0" vert="horz" wrap="square" lIns="227584" tIns="130048" rIns="227584" bIns="130048" numCol="1" spcCol="1270" anchor="ctr" anchorCtr="0">
           <a:noAutofit/>
         </a:bodyPr>
         <a:lstStyle/>
         <a:p>
-          <a:pPr marL="0" lvl="0" indent="0" algn="ctr" defTabSz="1466850">
+          <a:pPr marL="0" lvl="0" indent="0" algn="ctr" defTabSz="1422400">
             <a:lnSpc>
               <a:spcPct val="90000"/>
             </a:lnSpc>
@@ -20180,19 +20308,19 @@
             <a:buNone/>
           </a:pPr>
           <a:r>
-            <a:rPr lang="en-US" sz="3300" b="0" i="0" kern="1200">
+            <a:rPr lang="en-US" sz="3200" b="0" i="0" kern="1200">
               <a:latin typeface="Century Gothic"/>
             </a:rPr>
             <a:t>Match</a:t>
           </a:r>
-          <a:endParaRPr lang="en-US" sz="3300" kern="1200">
+          <a:endParaRPr lang="en-US" sz="3200" kern="1200">
             <a:latin typeface="Century Gothic"/>
           </a:endParaRPr>
         </a:p>
       </dsp:txBody>
       <dsp:txXfrm>
-        <a:off x="6689641" y="400114"/>
-        <a:ext cx="2932733" cy="1173093"/>
+        <a:off x="6689641" y="429933"/>
+        <a:ext cx="2932733" cy="1157375"/>
       </dsp:txXfrm>
     </dsp:sp>
     <dsp:sp modelId="{0F324DFC-98A1-4870-B3E1-F4078E06D589}">
@@ -20202,8 +20330,8 @@
       </dsp:nvSpPr>
       <dsp:spPr>
         <a:xfrm>
-          <a:off x="6689641" y="1573208"/>
-          <a:ext cx="2932733" cy="1449360"/>
+          <a:off x="6689641" y="1587309"/>
+          <a:ext cx="2932733" cy="1405440"/>
         </a:xfrm>
         <a:prstGeom prst="rect">
           <a:avLst/>
@@ -20246,12 +20374,12 @@
         <a:fontRef idx="minor"/>
       </dsp:style>
       <dsp:txBody>
-        <a:bodyPr spcFirstLastPara="0" vert="horz" wrap="square" lIns="176022" tIns="176022" rIns="234696" bIns="264033" numCol="1" spcCol="1270" anchor="t" anchorCtr="0">
+        <a:bodyPr spcFirstLastPara="0" vert="horz" wrap="square" lIns="170688" tIns="170688" rIns="227584" bIns="256032" numCol="1" spcCol="1270" anchor="t" anchorCtr="0">
           <a:noAutofit/>
         </a:bodyPr>
         <a:lstStyle/>
         <a:p>
-          <a:pPr marL="285750" lvl="1" indent="-285750" algn="l" defTabSz="1466850">
+          <a:pPr marL="285750" lvl="1" indent="-285750" algn="l" defTabSz="1422400">
             <a:lnSpc>
               <a:spcPct val="90000"/>
             </a:lnSpc>
@@ -20264,19 +20392,19 @@
             <a:buChar char="•"/>
           </a:pPr>
           <a:r>
-            <a:rPr lang="en-US" sz="3300" b="0" i="0" kern="1200">
+            <a:rPr lang="en-US" sz="3200" b="0" i="0" kern="1200">
               <a:latin typeface="Century Gothic"/>
             </a:rPr>
             <a:t>[ 90, 100]</a:t>
           </a:r>
-          <a:endParaRPr lang="en-US" sz="3300" kern="1200">
+          <a:endParaRPr lang="en-US" sz="3200" kern="1200">
             <a:latin typeface="Century Gothic"/>
           </a:endParaRPr>
         </a:p>
       </dsp:txBody>
       <dsp:txXfrm>
-        <a:off x="6689641" y="1573208"/>
-        <a:ext cx="2932733" cy="1449360"/>
+        <a:off x="6689641" y="1587309"/>
+        <a:ext cx="2932733" cy="1405440"/>
       </dsp:txXfrm>
     </dsp:sp>
   </dsp:spTree>
@@ -20651,8 +20779,8 @@
             <a:buNone/>
           </a:pPr>
           <a:r>
-            <a:rPr lang="en-US" sz="2300" kern="1200"/>
-            <a:t>Count how known matches we identified</a:t>
+            <a:rPr lang="en-US" sz="2300" kern="1200" dirty="0"/>
+            <a:t>Count how many matches we identified</a:t>
           </a:r>
         </a:p>
       </dsp:txBody>
@@ -21050,8 +21178,8 @@
       </dsp:nvSpPr>
       <dsp:spPr>
         <a:xfrm>
-          <a:off x="3280" y="7245"/>
-          <a:ext cx="3198279" cy="662400"/>
+          <a:off x="3280" y="20205"/>
+          <a:ext cx="3198279" cy="460800"/>
         </a:xfrm>
         <a:prstGeom prst="rect">
           <a:avLst/>
@@ -21129,12 +21257,12 @@
         </a:fontRef>
       </dsp:style>
       <dsp:txBody>
-        <a:bodyPr spcFirstLastPara="0" vert="horz" wrap="square" lIns="163576" tIns="93472" rIns="163576" bIns="93472" numCol="1" spcCol="1270" anchor="ctr" anchorCtr="0">
+        <a:bodyPr spcFirstLastPara="0" vert="horz" wrap="square" lIns="113792" tIns="65024" rIns="113792" bIns="65024" numCol="1" spcCol="1270" anchor="ctr" anchorCtr="0">
           <a:noAutofit/>
         </a:bodyPr>
         <a:lstStyle/>
         <a:p>
-          <a:pPr marL="0" lvl="0" indent="0" algn="ctr" defTabSz="1022350">
+          <a:pPr marL="0" lvl="0" indent="0" algn="ctr" defTabSz="711200">
             <a:lnSpc>
               <a:spcPct val="90000"/>
             </a:lnSpc>
@@ -21147,10 +21275,10 @@
             <a:buNone/>
           </a:pPr>
           <a:r>
-            <a:rPr lang="en-US" sz="2300" kern="1200"/>
+            <a:rPr lang="en-US" sz="1600" kern="1200"/>
             <a:t>CSV Parsing</a:t>
           </a:r>
-          <a:endParaRPr lang="en-US" sz="2300" kern="1200">
+          <a:endParaRPr lang="en-US" sz="1600" kern="1200">
             <a:solidFill>
               <a:srgbClr val="010000"/>
             </a:solidFill>
@@ -21159,8 +21287,8 @@
         </a:p>
       </dsp:txBody>
       <dsp:txXfrm>
-        <a:off x="3280" y="7245"/>
-        <a:ext cx="3198279" cy="662400"/>
+        <a:off x="3280" y="20205"/>
+        <a:ext cx="3198279" cy="460800"/>
       </dsp:txXfrm>
     </dsp:sp>
     <dsp:sp modelId="{AD423238-9BB4-400E-8A17-60392CB4CA8A}">
@@ -21170,8 +21298,8 @@
       </dsp:nvSpPr>
       <dsp:spPr>
         <a:xfrm>
-          <a:off x="3280" y="669646"/>
-          <a:ext cx="3198279" cy="1010160"/>
+          <a:off x="3280" y="481005"/>
+          <a:ext cx="3198279" cy="1185840"/>
         </a:xfrm>
         <a:prstGeom prst="rect">
           <a:avLst/>
@@ -21214,12 +21342,12 @@
         <a:fontRef idx="minor"/>
       </dsp:style>
       <dsp:txBody>
-        <a:bodyPr spcFirstLastPara="0" vert="horz" wrap="square" lIns="122682" tIns="122682" rIns="163576" bIns="184023" numCol="1" spcCol="1270" anchor="t" anchorCtr="0">
+        <a:bodyPr spcFirstLastPara="0" vert="horz" wrap="square" lIns="85344" tIns="85344" rIns="113792" bIns="128016" numCol="1" spcCol="1270" anchor="t" anchorCtr="0">
           <a:noAutofit/>
         </a:bodyPr>
         <a:lstStyle/>
         <a:p>
-          <a:pPr marL="228600" lvl="1" indent="-228600" algn="l" defTabSz="1022350">
+          <a:pPr marL="171450" lvl="1" indent="-171450" algn="l" defTabSz="711200">
             <a:lnSpc>
               <a:spcPct val="90000"/>
             </a:lnSpc>
@@ -21232,14 +21360,14 @@
             <a:buChar char="•"/>
           </a:pPr>
           <a:r>
-            <a:rPr lang="en-US" sz="2300" kern="1200"/>
+            <a:rPr lang="en-US" sz="1600" kern="1200"/>
             <a:t>Apache's Commons-CSV Library</a:t>
           </a:r>
         </a:p>
       </dsp:txBody>
       <dsp:txXfrm>
-        <a:off x="3280" y="669646"/>
-        <a:ext cx="3198279" cy="1010160"/>
+        <a:off x="3280" y="481005"/>
+        <a:ext cx="3198279" cy="1185840"/>
       </dsp:txXfrm>
     </dsp:sp>
     <dsp:sp modelId="{C69EBD1D-33B8-41A3-9F1A-B18E772B4FED}">
@@ -21249,8 +21377,8 @@
       </dsp:nvSpPr>
       <dsp:spPr>
         <a:xfrm>
-          <a:off x="3649318" y="7245"/>
-          <a:ext cx="3198279" cy="662400"/>
+          <a:off x="3649318" y="20205"/>
+          <a:ext cx="3198279" cy="460800"/>
         </a:xfrm>
         <a:prstGeom prst="rect">
           <a:avLst/>
@@ -21328,12 +21456,12 @@
         </a:fontRef>
       </dsp:style>
       <dsp:txBody>
-        <a:bodyPr spcFirstLastPara="0" vert="horz" wrap="square" lIns="163576" tIns="93472" rIns="163576" bIns="93472" numCol="1" spcCol="1270" anchor="ctr" anchorCtr="0">
+        <a:bodyPr spcFirstLastPara="0" vert="horz" wrap="square" lIns="113792" tIns="65024" rIns="113792" bIns="65024" numCol="1" spcCol="1270" anchor="ctr" anchorCtr="0">
           <a:noAutofit/>
         </a:bodyPr>
         <a:lstStyle/>
         <a:p>
-          <a:pPr marL="0" lvl="0" indent="0" algn="ctr" defTabSz="1022350">
+          <a:pPr marL="0" lvl="0" indent="0" algn="ctr" defTabSz="711200">
             <a:lnSpc>
               <a:spcPct val="90000"/>
             </a:lnSpc>
@@ -21346,14 +21474,14 @@
             <a:buNone/>
           </a:pPr>
           <a:r>
-            <a:rPr lang="en-US" sz="2300" kern="1200"/>
+            <a:rPr lang="en-US" sz="1600" kern="1200"/>
             <a:t>Phonetic Encoding</a:t>
           </a:r>
         </a:p>
       </dsp:txBody>
       <dsp:txXfrm>
-        <a:off x="3649318" y="7245"/>
-        <a:ext cx="3198279" cy="662400"/>
+        <a:off x="3649318" y="20205"/>
+        <a:ext cx="3198279" cy="460800"/>
       </dsp:txXfrm>
     </dsp:sp>
     <dsp:sp modelId="{5ADA738D-7366-4CF7-9EEF-48BD3EE37EB5}">
@@ -21363,8 +21491,8 @@
       </dsp:nvSpPr>
       <dsp:spPr>
         <a:xfrm>
-          <a:off x="3649318" y="669646"/>
-          <a:ext cx="3198279" cy="1010160"/>
+          <a:off x="3649318" y="481005"/>
+          <a:ext cx="3198279" cy="1185840"/>
         </a:xfrm>
         <a:prstGeom prst="rect">
           <a:avLst/>
@@ -21407,12 +21535,12 @@
         <a:fontRef idx="minor"/>
       </dsp:style>
       <dsp:txBody>
-        <a:bodyPr spcFirstLastPara="0" vert="horz" wrap="square" lIns="122682" tIns="122682" rIns="163576" bIns="184023" numCol="1" spcCol="1270" anchor="t" anchorCtr="0">
+        <a:bodyPr spcFirstLastPara="0" vert="horz" wrap="square" lIns="85344" tIns="85344" rIns="113792" bIns="128016" numCol="1" spcCol="1270" anchor="t" anchorCtr="0">
           <a:noAutofit/>
         </a:bodyPr>
         <a:lstStyle/>
         <a:p>
-          <a:pPr marL="228600" lvl="1" indent="-228600" algn="l" defTabSz="1022350">
+          <a:pPr marL="171450" lvl="1" indent="-171450" algn="l" defTabSz="711200">
             <a:lnSpc>
               <a:spcPct val="90000"/>
             </a:lnSpc>
@@ -21425,14 +21553,54 @@
             <a:buChar char="•"/>
           </a:pPr>
           <a:r>
-            <a:rPr lang="en-US" sz="2300" kern="1200"/>
+            <a:rPr lang="en-US" sz="1600" kern="1200" dirty="0"/>
             <a:t>Apache's Commons-Codec Library</a:t>
+          </a:r>
+        </a:p>
+        <a:p>
+          <a:pPr marL="171450" lvl="1" indent="-171450" algn="l" defTabSz="711200">
+            <a:lnSpc>
+              <a:spcPct val="90000"/>
+            </a:lnSpc>
+            <a:spcBef>
+              <a:spcPct val="0"/>
+            </a:spcBef>
+            <a:spcAft>
+              <a:spcPct val="15000"/>
+            </a:spcAft>
+            <a:buChar char="•"/>
+          </a:pPr>
+          <a:r>
+            <a:rPr lang="en-US" sz="1600" kern="1200" dirty="0"/>
+            <a:t>Ex.</a:t>
+          </a:r>
+        </a:p>
+        <a:p>
+          <a:pPr marL="342900" lvl="2" indent="-171450" algn="l" defTabSz="711200">
+            <a:lnSpc>
+              <a:spcPct val="90000"/>
+            </a:lnSpc>
+            <a:spcBef>
+              <a:spcPct val="0"/>
+            </a:spcBef>
+            <a:spcAft>
+              <a:spcPct val="15000"/>
+            </a:spcAft>
+            <a:buChar char="•"/>
+          </a:pPr>
+          <a:r>
+            <a:rPr lang="en-US" sz="1600" kern="1200" dirty="0" err="1"/>
+            <a:t>Illesca</a:t>
+          </a:r>
+          <a:r>
+            <a:rPr lang="en-US" sz="1600" kern="1200" dirty="0"/>
+            <a:t> -&gt; ILSK</a:t>
           </a:r>
         </a:p>
       </dsp:txBody>
       <dsp:txXfrm>
-        <a:off x="3649318" y="669646"/>
-        <a:ext cx="3198279" cy="1010160"/>
+        <a:off x="3649318" y="481005"/>
+        <a:ext cx="3198279" cy="1185840"/>
       </dsp:txXfrm>
     </dsp:sp>
     <dsp:sp modelId="{57BCF1C9-8773-4798-B4A7-D1ED852BB8F5}">
@@ -21442,8 +21610,8 @@
       </dsp:nvSpPr>
       <dsp:spPr>
         <a:xfrm>
-          <a:off x="7295357" y="7245"/>
-          <a:ext cx="3198279" cy="662400"/>
+          <a:off x="7295357" y="20205"/>
+          <a:ext cx="3198279" cy="460800"/>
         </a:xfrm>
         <a:prstGeom prst="rect">
           <a:avLst/>
@@ -21521,12 +21689,12 @@
         </a:fontRef>
       </dsp:style>
       <dsp:txBody>
-        <a:bodyPr spcFirstLastPara="0" vert="horz" wrap="square" lIns="163576" tIns="93472" rIns="163576" bIns="93472" numCol="1" spcCol="1270" anchor="ctr" anchorCtr="0">
+        <a:bodyPr spcFirstLastPara="0" vert="horz" wrap="square" lIns="113792" tIns="65024" rIns="113792" bIns="65024" numCol="1" spcCol="1270" anchor="ctr" anchorCtr="0">
           <a:noAutofit/>
         </a:bodyPr>
         <a:lstStyle/>
         <a:p>
-          <a:pPr marL="0" lvl="0" indent="0" algn="ctr" defTabSz="1022350">
+          <a:pPr marL="0" lvl="0" indent="0" algn="ctr" defTabSz="711200">
             <a:lnSpc>
               <a:spcPct val="90000"/>
             </a:lnSpc>
@@ -21539,14 +21707,14 @@
             <a:buNone/>
           </a:pPr>
           <a:r>
-            <a:rPr lang="en-US" sz="2300" kern="1200"/>
+            <a:rPr lang="en-US" sz="1600" kern="1200"/>
             <a:t>Json Parsing</a:t>
           </a:r>
         </a:p>
       </dsp:txBody>
       <dsp:txXfrm>
-        <a:off x="7295357" y="7245"/>
-        <a:ext cx="3198279" cy="662400"/>
+        <a:off x="7295357" y="20205"/>
+        <a:ext cx="3198279" cy="460800"/>
       </dsp:txXfrm>
     </dsp:sp>
     <dsp:sp modelId="{52982DCB-31B4-4B9A-9096-43BE6F508B52}">
@@ -21556,8 +21724,8 @@
       </dsp:nvSpPr>
       <dsp:spPr>
         <a:xfrm>
-          <a:off x="7295357" y="669646"/>
-          <a:ext cx="3198279" cy="1010160"/>
+          <a:off x="7295357" y="481005"/>
+          <a:ext cx="3198279" cy="1185840"/>
         </a:xfrm>
         <a:prstGeom prst="rect">
           <a:avLst/>
@@ -21600,12 +21768,12 @@
         <a:fontRef idx="minor"/>
       </dsp:style>
       <dsp:txBody>
-        <a:bodyPr spcFirstLastPara="0" vert="horz" wrap="square" lIns="122682" tIns="122682" rIns="163576" bIns="184023" numCol="1" spcCol="1270" anchor="t" anchorCtr="0">
+        <a:bodyPr spcFirstLastPara="0" vert="horz" wrap="square" lIns="85344" tIns="85344" rIns="113792" bIns="128016" numCol="1" spcCol="1270" anchor="t" anchorCtr="0">
           <a:noAutofit/>
         </a:bodyPr>
         <a:lstStyle/>
         <a:p>
-          <a:pPr marL="228600" lvl="1" indent="-228600" algn="l" defTabSz="1022350">
+          <a:pPr marL="171450" lvl="1" indent="-171450" algn="l" defTabSz="711200">
             <a:lnSpc>
               <a:spcPct val="90000"/>
             </a:lnSpc>
@@ -21618,18 +21786,18 @@
             <a:buChar char="•"/>
           </a:pPr>
           <a:r>
-            <a:rPr lang="en-US" sz="2300" kern="1200" err="1"/>
+            <a:rPr lang="en-US" sz="1600" kern="1200" err="1"/>
             <a:t>Org.json's</a:t>
           </a:r>
           <a:r>
-            <a:rPr lang="en-US" sz="2300" kern="1200"/>
+            <a:rPr lang="en-US" sz="1600" kern="1200"/>
             <a:t> JSON library</a:t>
           </a:r>
         </a:p>
       </dsp:txBody>
       <dsp:txXfrm>
-        <a:off x="7295357" y="669646"/>
-        <a:ext cx="3198279" cy="1010160"/>
+        <a:off x="7295357" y="481005"/>
+        <a:ext cx="3198279" cy="1185840"/>
       </dsp:txXfrm>
     </dsp:sp>
   </dsp:spTree>
@@ -22509,8 +22677,8 @@
             <a:buNone/>
           </a:pPr>
           <a:r>
-            <a:rPr lang="en-US" sz="3500" kern="1200"/>
-            <a:t>Simplicity</a:t>
+            <a:rPr lang="en-US" sz="3500" kern="1200" dirty="0"/>
+            <a:t>Simplicity &amp; Flexibility</a:t>
           </a:r>
         </a:p>
       </dsp:txBody>
@@ -27497,12 +27665,12 @@
         <a:fontRef idx="minor"/>
       </dsp:style>
       <dsp:txBody>
-        <a:bodyPr spcFirstLastPara="0" vert="horz" wrap="square" lIns="35560" tIns="35560" rIns="35560" bIns="35560" numCol="1" spcCol="1270" anchor="ctr" anchorCtr="0">
+        <a:bodyPr spcFirstLastPara="0" vert="horz" wrap="square" lIns="29210" tIns="29210" rIns="29210" bIns="29210" numCol="1" spcCol="1270" anchor="ctr" anchorCtr="0">
           <a:noAutofit/>
         </a:bodyPr>
         <a:lstStyle/>
         <a:p>
-          <a:pPr marL="0" lvl="0" indent="0" algn="ctr" defTabSz="1244600">
+          <a:pPr marL="0" lvl="0" indent="0" algn="ctr" defTabSz="1022350">
             <a:lnSpc>
               <a:spcPct val="90000"/>
             </a:lnSpc>
@@ -27515,16 +27683,48 @@
             <a:buNone/>
           </a:pPr>
           <a:r>
-            <a:rPr lang="en-US" sz="2800" kern="1200" err="1">
+            <a:rPr lang="en-US" sz="2300" kern="1200" dirty="0" err="1">
               <a:latin typeface="Century Gothic" panose="020B0502020202020204"/>
             </a:rPr>
             <a:t>Levenshtein</a:t>
           </a:r>
           <a:r>
-            <a:rPr lang="en-US" sz="2800" kern="1200">
+            <a:rPr lang="en-US" sz="2300" kern="1200" dirty="0">
               <a:latin typeface="Century Gothic" panose="020B0502020202020204"/>
             </a:rPr>
             <a:t> Distance</a:t>
+          </a:r>
+        </a:p>
+        <a:p>
+          <a:pPr marL="0" lvl="0" indent="0" algn="ctr" defTabSz="1022350">
+            <a:lnSpc>
+              <a:spcPct val="90000"/>
+            </a:lnSpc>
+            <a:spcBef>
+              <a:spcPct val="0"/>
+            </a:spcBef>
+            <a:spcAft>
+              <a:spcPct val="35000"/>
+            </a:spcAft>
+            <a:buNone/>
+          </a:pPr>
+          <a:r>
+            <a:rPr lang="en-US" sz="2300" kern="1200" dirty="0">
+              <a:latin typeface="Century Gothic" panose="020B0502020202020204"/>
+            </a:rPr>
+            <a:t>Ex. Axel ~ </a:t>
+          </a:r>
+          <a:r>
+            <a:rPr lang="en-US" sz="2300" kern="1200" dirty="0" err="1">
+              <a:latin typeface="Century Gothic" panose="020B0502020202020204"/>
+            </a:rPr>
+            <a:t>Axl</a:t>
+          </a:r>
+          <a:r>
+            <a:rPr lang="en-US" sz="2300" kern="1200" dirty="0">
+              <a:latin typeface="Century Gothic" panose="020B0502020202020204"/>
+            </a:rPr>
+            <a:t> = 85.7</a:t>
           </a:r>
         </a:p>
       </dsp:txBody>
@@ -27667,12 +27867,12 @@
         <a:fontRef idx="minor"/>
       </dsp:style>
       <dsp:txBody>
-        <a:bodyPr spcFirstLastPara="0" vert="horz" wrap="square" lIns="35560" tIns="35560" rIns="35560" bIns="35560" numCol="1" spcCol="1270" anchor="ctr" anchorCtr="0">
+        <a:bodyPr spcFirstLastPara="0" vert="horz" wrap="square" lIns="29210" tIns="29210" rIns="29210" bIns="29210" numCol="1" spcCol="1270" anchor="ctr" anchorCtr="0">
           <a:noAutofit/>
         </a:bodyPr>
         <a:lstStyle/>
         <a:p>
-          <a:pPr marL="0" lvl="0" indent="0" algn="ctr" defTabSz="1244600">
+          <a:pPr marL="0" lvl="0" indent="0" algn="ctr" defTabSz="1022350">
             <a:lnSpc>
               <a:spcPct val="90000"/>
             </a:lnSpc>
@@ -27685,7 +27885,7 @@
             <a:buNone/>
           </a:pPr>
           <a:r>
-            <a:rPr lang="en-US" sz="2800" kern="1200">
+            <a:rPr lang="en-US" sz="2300" kern="1200">
               <a:latin typeface="Century Gothic" panose="020B0502020202020204"/>
             </a:rPr>
             <a:t>Ratio between 0 – 100</a:t>
@@ -27941,12 +28141,12 @@
         <a:fontRef idx="minor"/>
       </dsp:style>
       <dsp:txBody>
-        <a:bodyPr spcFirstLastPara="0" vert="horz" wrap="square" lIns="35560" tIns="35560" rIns="35560" bIns="35560" numCol="1" spcCol="1270" anchor="ctr" anchorCtr="0">
+        <a:bodyPr spcFirstLastPara="0" vert="horz" wrap="square" lIns="29210" tIns="29210" rIns="29210" bIns="29210" numCol="1" spcCol="1270" anchor="ctr" anchorCtr="0">
           <a:noAutofit/>
         </a:bodyPr>
         <a:lstStyle/>
         <a:p>
-          <a:pPr marL="0" lvl="0" indent="0" algn="ctr" defTabSz="1244600">
+          <a:pPr marL="0" lvl="0" indent="0" algn="ctr" defTabSz="1022350">
             <a:lnSpc>
               <a:spcPct val="90000"/>
             </a:lnSpc>
@@ -27959,7 +28159,7 @@
             <a:buNone/>
           </a:pPr>
           <a:r>
-            <a:rPr lang="en-US" sz="2800" kern="1200">
+            <a:rPr lang="en-US" sz="2300" kern="1200">
               <a:latin typeface="Century Gothic" panose="020B0502020202020204"/>
             </a:rPr>
             <a:t>Weights per field</a:t>
@@ -28105,12 +28305,12 @@
         <a:fontRef idx="minor"/>
       </dsp:style>
       <dsp:txBody>
-        <a:bodyPr spcFirstLastPara="0" vert="horz" wrap="square" lIns="35560" tIns="35560" rIns="35560" bIns="35560" numCol="1" spcCol="1270" anchor="ctr" anchorCtr="0">
+        <a:bodyPr spcFirstLastPara="0" vert="horz" wrap="square" lIns="29210" tIns="29210" rIns="29210" bIns="29210" numCol="1" spcCol="1270" anchor="ctr" anchorCtr="0">
           <a:noAutofit/>
         </a:bodyPr>
         <a:lstStyle/>
         <a:p>
-          <a:pPr marL="0" lvl="0" indent="0" algn="ctr" defTabSz="1244600">
+          <a:pPr marL="0" lvl="0" indent="0" algn="ctr" defTabSz="1022350">
             <a:lnSpc>
               <a:spcPct val="90000"/>
             </a:lnSpc>
@@ -28123,7 +28323,7 @@
             <a:buNone/>
           </a:pPr>
           <a:r>
-            <a:rPr lang="en-US" sz="2800" kern="1200">
+            <a:rPr lang="en-US" sz="2300" kern="1200">
               <a:latin typeface="Century Gothic" panose="020B0502020202020204"/>
             </a:rPr>
             <a:t>Sum of weights equal to 1</a:t>
@@ -28379,12 +28579,12 @@
         <a:fontRef idx="minor"/>
       </dsp:style>
       <dsp:txBody>
-        <a:bodyPr spcFirstLastPara="0" vert="horz" wrap="square" lIns="35560" tIns="35560" rIns="35560" bIns="35560" numCol="1" spcCol="1270" anchor="ctr" anchorCtr="0">
+        <a:bodyPr spcFirstLastPara="0" vert="horz" wrap="square" lIns="29210" tIns="29210" rIns="29210" bIns="29210" numCol="1" spcCol="1270" anchor="ctr" anchorCtr="0">
           <a:noAutofit/>
         </a:bodyPr>
         <a:lstStyle/>
         <a:p>
-          <a:pPr marL="0" lvl="0" indent="0" algn="ctr" defTabSz="1244600">
+          <a:pPr marL="0" lvl="0" indent="0" algn="ctr" defTabSz="1022350">
             <a:lnSpc>
               <a:spcPct val="90000"/>
             </a:lnSpc>
@@ -28397,7 +28597,7 @@
             <a:buNone/>
           </a:pPr>
           <a:r>
-            <a:rPr lang="en-US" sz="2800" kern="1200">
+            <a:rPr lang="en-US" sz="2300" kern="1200">
               <a:solidFill>
                 <a:srgbClr val="000000"/>
               </a:solidFill>
@@ -28546,12 +28746,12 @@
         <a:fontRef idx="minor"/>
       </dsp:style>
       <dsp:txBody>
-        <a:bodyPr spcFirstLastPara="0" vert="horz" wrap="square" lIns="35560" tIns="35560" rIns="35560" bIns="35560" numCol="1" spcCol="1270" anchor="ctr" anchorCtr="0">
+        <a:bodyPr spcFirstLastPara="0" vert="horz" wrap="square" lIns="29210" tIns="29210" rIns="29210" bIns="29210" numCol="1" spcCol="1270" anchor="ctr" anchorCtr="0">
           <a:noAutofit/>
         </a:bodyPr>
         <a:lstStyle/>
         <a:p>
-          <a:pPr marL="0" lvl="0" indent="0" algn="ctr" defTabSz="1244600">
+          <a:pPr marL="0" lvl="0" indent="0" algn="ctr" defTabSz="1022350">
             <a:lnSpc>
               <a:spcPct val="90000"/>
             </a:lnSpc>
@@ -28564,7 +28764,7 @@
             <a:buNone/>
           </a:pPr>
           <a:r>
-            <a:rPr lang="en-US" sz="2800" kern="1200">
+            <a:rPr lang="en-US" sz="2300" kern="1200">
               <a:latin typeface="Century Gothic" panose="020B0502020202020204"/>
             </a:rPr>
             <a:t>A score of 100 is a perfect match</a:t>
@@ -49581,7 +49781,7 @@
           <a:p>
             <a:fld id="{56731ED0-DD9C-442B-8AC3-97D41B5157C2}" type="datetimeFigureOut">
               <a:rPr lang="en-US"/>
-              <a:t>2/10/2019</a:t>
+              <a:t>2/11/2019</a:t>
             </a:fld>
             <a:endParaRPr lang="en-US"/>
           </a:p>
@@ -49915,7 +50115,7 @@
           <a:p>
             <a:fld id="{A6A2F694-2DAC-417B-91B2-2791DD09F1C2}" type="slidenum">
               <a:rPr lang="en-US"/>
-              <a:t>‹#›</a:t>
+              <a:t>1</a:t>
             </a:fld>
             <a:endParaRPr lang="en-US"/>
           </a:p>
@@ -50108,7 +50308,7 @@
           <a:p>
             <a:fld id="{846CE7D5-CF57-46EF-B807-FDD0502418D4}" type="datetimeFigureOut">
               <a:rPr lang="en-US" smtClean="0"/>
-              <a:t>2/10/2019</a:t>
+              <a:t>2/11/2019</a:t>
             </a:fld>
             <a:endParaRPr lang="en-US"/>
           </a:p>
@@ -50279,7 +50479,7 @@
           <a:p>
             <a:fld id="{846CE7D5-CF57-46EF-B807-FDD0502418D4}" type="datetimeFigureOut">
               <a:rPr lang="en-US" smtClean="0"/>
-              <a:t>2/10/2019</a:t>
+              <a:t>2/11/2019</a:t>
             </a:fld>
             <a:endParaRPr lang="en-US"/>
           </a:p>
@@ -50503,7 +50703,7 @@
           <a:p>
             <a:fld id="{846CE7D5-CF57-46EF-B807-FDD0502418D4}" type="datetimeFigureOut">
               <a:rPr lang="en-US" smtClean="0"/>
-              <a:t>2/10/2019</a:t>
+              <a:t>2/11/2019</a:t>
             </a:fld>
             <a:endParaRPr lang="en-US"/>
           </a:p>
@@ -50684,7 +50884,7 @@
           <a:p>
             <a:fld id="{846CE7D5-CF57-46EF-B807-FDD0502418D4}" type="datetimeFigureOut">
               <a:rPr lang="en-US" smtClean="0"/>
-              <a:t>2/10/2019</a:t>
+              <a:t>2/11/2019</a:t>
             </a:fld>
             <a:endParaRPr lang="en-US"/>
           </a:p>
@@ -50992,7 +51192,7 @@
           <a:p>
             <a:fld id="{846CE7D5-CF57-46EF-B807-FDD0502418D4}" type="datetimeFigureOut">
               <a:rPr lang="en-US" smtClean="0"/>
-              <a:t>2/10/2019</a:t>
+              <a:t>2/11/2019</a:t>
             </a:fld>
             <a:endParaRPr lang="en-US"/>
           </a:p>
@@ -51296,7 +51496,7 @@
           <a:p>
             <a:fld id="{846CE7D5-CF57-46EF-B807-FDD0502418D4}" type="datetimeFigureOut">
               <a:rPr lang="en-US" smtClean="0"/>
-              <a:t>2/10/2019</a:t>
+              <a:t>2/11/2019</a:t>
             </a:fld>
             <a:endParaRPr lang="en-US"/>
           </a:p>
@@ -51718,7 +51918,7 @@
           <a:p>
             <a:fld id="{846CE7D5-CF57-46EF-B807-FDD0502418D4}" type="datetimeFigureOut">
               <a:rPr lang="en-US" smtClean="0"/>
-              <a:t>2/10/2019</a:t>
+              <a:t>2/11/2019</a:t>
             </a:fld>
             <a:endParaRPr lang="en-US"/>
           </a:p>
@@ -51838,7 +52038,7 @@
           <a:p>
             <a:fld id="{846CE7D5-CF57-46EF-B807-FDD0502418D4}" type="datetimeFigureOut">
               <a:rPr lang="en-US" smtClean="0"/>
-              <a:t>2/10/2019</a:t>
+              <a:t>2/11/2019</a:t>
             </a:fld>
             <a:endParaRPr lang="en-US"/>
           </a:p>
@@ -51936,7 +52136,7 @@
           <a:p>
             <a:fld id="{846CE7D5-CF57-46EF-B807-FDD0502418D4}" type="datetimeFigureOut">
               <a:rPr lang="en-US" smtClean="0"/>
-              <a:t>2/10/2019</a:t>
+              <a:t>2/11/2019</a:t>
             </a:fld>
             <a:endParaRPr lang="en-US"/>
           </a:p>
@@ -52210,7 +52410,7 @@
           <a:p>
             <a:fld id="{846CE7D5-CF57-46EF-B807-FDD0502418D4}" type="datetimeFigureOut">
               <a:rPr lang="en-US" smtClean="0"/>
-              <a:t>2/10/2019</a:t>
+              <a:t>2/11/2019</a:t>
             </a:fld>
             <a:endParaRPr lang="en-US"/>
           </a:p>
@@ -52476,7 +52676,7 @@
           <a:p>
             <a:fld id="{846CE7D5-CF57-46EF-B807-FDD0502418D4}" type="datetimeFigureOut">
               <a:rPr lang="en-US" smtClean="0"/>
-              <a:t>2/10/2019</a:t>
+              <a:t>2/11/2019</a:t>
             </a:fld>
             <a:endParaRPr lang="en-US"/>
           </a:p>
@@ -52726,7 +52926,7 @@
           <a:p>
             <a:fld id="{846CE7D5-CF57-46EF-B807-FDD0502418D4}" type="datetimeFigureOut">
               <a:rPr lang="en-US" smtClean="0"/>
-              <a:t>2/10/2019</a:t>
+              <a:t>2/11/2019</a:t>
             </a:fld>
             <a:endParaRPr lang="en-US"/>
           </a:p>
@@ -54178,7 +54378,7 @@
             <p:ph idx="1"/>
             <p:extLst>
               <p:ext uri="{D42A27DB-BD31-4B8C-83A1-F6EECF244321}">
-                <p14:modId xmlns:p14="http://schemas.microsoft.com/office/powerpoint/2010/main" val="712132601"/>
+                <p14:modId xmlns:p14="http://schemas.microsoft.com/office/powerpoint/2010/main" val="1359771068"/>
               </p:ext>
             </p:extLst>
           </p:nvPr>
@@ -54411,7 +54611,7 @@
             <p:ph idx="1"/>
             <p:extLst>
               <p:ext uri="{D42A27DB-BD31-4B8C-83A1-F6EECF244321}">
-                <p14:modId xmlns:p14="http://schemas.microsoft.com/office/powerpoint/2010/main" val="1287724710"/>
+                <p14:modId xmlns:p14="http://schemas.microsoft.com/office/powerpoint/2010/main" val="3904625458"/>
               </p:ext>
             </p:extLst>
           </p:nvPr>
@@ -54518,7 +54718,7 @@
             <p:ph idx="1"/>
             <p:extLst>
               <p:ext uri="{D42A27DB-BD31-4B8C-83A1-F6EECF244321}">
-                <p14:modId xmlns:p14="http://schemas.microsoft.com/office/powerpoint/2010/main" val="649552702"/>
+                <p14:modId xmlns:p14="http://schemas.microsoft.com/office/powerpoint/2010/main" val="3259040028"/>
               </p:ext>
             </p:extLst>
           </p:nvPr>
@@ -55490,7 +55690,7 @@
           </p:nvPr>
         </p:nvPicPr>
         <p:blipFill>
-          <a:blip r:embed="rId2">
+          <a:blip r:embed="rId2" cstate="print">
             <a:extLst>
               <a:ext uri="{28A0092B-C50C-407E-A947-70E740481C1C}">
                 <a14:useLocalDpi xmlns:a14="http://schemas.microsoft.com/office/drawing/2010/main" val="0"/>
@@ -55747,7 +55947,7 @@
             <p:ph idx="1"/>
             <p:extLst>
               <p:ext uri="{D42A27DB-BD31-4B8C-83A1-F6EECF244321}">
-                <p14:modId xmlns:p14="http://schemas.microsoft.com/office/powerpoint/2010/main" val="3666450314"/>
+                <p14:modId xmlns:p14="http://schemas.microsoft.com/office/powerpoint/2010/main" val="512115120"/>
               </p:ext>
             </p:extLst>
           </p:nvPr>
@@ -55886,165 +56086,6 @@
 </file>
 
 <file path=ppt/slides/slide3.xml><?xml version="1.0" encoding="utf-8"?>
-<p:sld xmlns:a="http://schemas.openxmlformats.org/drawingml/2006/main" xmlns:r="http://schemas.openxmlformats.org/officeDocument/2006/relationships" xmlns:p="http://schemas.openxmlformats.org/presentationml/2006/main">
-  <p:cSld>
-    <p:spTree>
-      <p:nvGrpSpPr>
-        <p:cNvPr id="1" name=""/>
-        <p:cNvGrpSpPr/>
-        <p:nvPr/>
-      </p:nvGrpSpPr>
-      <p:grpSpPr>
-        <a:xfrm>
-          <a:off x="0" y="0"/>
-          <a:ext cx="0" cy="0"/>
-          <a:chOff x="0" y="0"/>
-          <a:chExt cx="0" cy="0"/>
-        </a:xfrm>
-      </p:grpSpPr>
-      <p:sp>
-        <p:nvSpPr>
-          <p:cNvPr id="2" name="Title 1">
-            <a:extLst>
-              <a:ext uri="{FF2B5EF4-FFF2-40B4-BE49-F238E27FC236}">
-                <a16:creationId xmlns:a16="http://schemas.microsoft.com/office/drawing/2014/main" id="{988D8A34-E4C6-E148-9EA1-2BB1FC96F2E2}"/>
-              </a:ext>
-            </a:extLst>
-          </p:cNvPr>
-          <p:cNvSpPr>
-            <a:spLocks noGrp="1"/>
-          </p:cNvSpPr>
-          <p:nvPr>
-            <p:ph type="title"/>
-          </p:nvPr>
-        </p:nvSpPr>
-        <p:spPr/>
-        <p:txBody>
-          <a:bodyPr>
-            <a:normAutofit/>
-          </a:bodyPr>
-          <a:lstStyle/>
-          <a:p>
-            <a:r>
-              <a:rPr lang="en-US" sz="4800"/>
-              <a:t>Client info</a:t>
-            </a:r>
-          </a:p>
-        </p:txBody>
-      </p:sp>
-      <p:pic>
-        <p:nvPicPr>
-          <p:cNvPr id="7" name="Picture 7" descr="A close up of a logo&#10;&#10;Description generated with very high confidence">
-            <a:extLst>
-              <a:ext uri="{FF2B5EF4-FFF2-40B4-BE49-F238E27FC236}">
-                <a16:creationId xmlns:a16="http://schemas.microsoft.com/office/drawing/2014/main" id="{637E1154-2245-4340-ACC9-A4604B346BE9}"/>
-              </a:ext>
-            </a:extLst>
-          </p:cNvPr>
-          <p:cNvPicPr>
-            <a:picLocks noGrp="1" noChangeAspect="1"/>
-          </p:cNvPicPr>
-          <p:nvPr>
-            <p:ph idx="1"/>
-          </p:nvPr>
-        </p:nvPicPr>
-        <p:blipFill>
-          <a:blip r:embed="rId2"/>
-          <a:stretch>
-            <a:fillRect/>
-          </a:stretch>
-        </p:blipFill>
-        <p:spPr>
-          <a:xfrm>
-            <a:off x="2590735" y="4772464"/>
-            <a:ext cx="7021878" cy="1290758"/>
-          </a:xfrm>
-          <a:prstGeom prst="rect">
-            <a:avLst/>
-          </a:prstGeom>
-        </p:spPr>
-      </p:pic>
-      <p:sp>
-        <p:nvSpPr>
-          <p:cNvPr id="6" name="Text Placeholder 5">
-            <a:extLst>
-              <a:ext uri="{FF2B5EF4-FFF2-40B4-BE49-F238E27FC236}">
-                <a16:creationId xmlns:a16="http://schemas.microsoft.com/office/drawing/2014/main" id="{B08C1F55-8ADE-46D5-BB1E-94A5AD63C938}"/>
-              </a:ext>
-            </a:extLst>
-          </p:cNvPr>
-          <p:cNvSpPr>
-            <a:spLocks noGrp="1"/>
-          </p:cNvSpPr>
-          <p:nvPr>
-            <p:ph type="body" sz="half" idx="2"/>
-          </p:nvPr>
-        </p:nvSpPr>
-        <p:spPr>
-          <a:xfrm>
-            <a:off x="2743827" y="2566952"/>
-            <a:ext cx="6697782" cy="2006012"/>
-          </a:xfrm>
-        </p:spPr>
-        <p:txBody>
-          <a:bodyPr vert="horz" lIns="91440" tIns="45720" rIns="91440" bIns="45720" rtlCol="0" anchor="t">
-            <a:noAutofit/>
-          </a:bodyPr>
-          <a:lstStyle/>
-          <a:p>
-            <a:pPr algn="ctr"/>
-            <a:r>
-              <a:rPr lang="en-US" sz="3000"/>
-              <a:t>Local company based in Kalamazoo, MI</a:t>
-            </a:r>
-          </a:p>
-          <a:p>
-            <a:pPr algn="ctr"/>
-            <a:r>
-              <a:rPr lang="en-US" sz="3000"/>
-              <a:t> Master data management platform</a:t>
-            </a:r>
-          </a:p>
-          <a:p>
-            <a:pPr algn="ctr"/>
-            <a:r>
-              <a:rPr lang="en-US" sz="3000" dirty="0">
-                <a:solidFill>
-                  <a:schemeClr val="bg2">
-                    <a:lumMod val="50000"/>
-                  </a:schemeClr>
-                </a:solidFill>
-                <a:hlinkClick r:id="rId3"/>
-              </a:rPr>
-              <a:t>https://www.salespage.com/</a:t>
-            </a:r>
-            <a:endParaRPr lang="en-US" sz="3000">
-              <a:solidFill>
-                <a:schemeClr val="bg2">
-                  <a:lumMod val="50000"/>
-                </a:schemeClr>
-              </a:solidFill>
-            </a:endParaRPr>
-          </a:p>
-        </p:txBody>
-      </p:sp>
-    </p:spTree>
-    <p:extLst>
-      <p:ext uri="{BB962C8B-B14F-4D97-AF65-F5344CB8AC3E}">
-        <p14:creationId xmlns:p14="http://schemas.microsoft.com/office/powerpoint/2010/main" val="1062428199"/>
-      </p:ext>
-    </p:extLst>
-  </p:cSld>
-  <p:clrMapOvr>
-    <a:masterClrMapping/>
-  </p:clrMapOvr>
-  <p:transition spd="med">
-    <p:push dir="u"/>
-  </p:transition>
-</p:sld>
-</file>
-
-<file path=ppt/slides/slide4.xml><?xml version="1.0" encoding="utf-8"?>
 <p:sld xmlns:a="http://schemas.openxmlformats.org/drawingml/2006/main" xmlns:r="http://schemas.openxmlformats.org/officeDocument/2006/relationships" xmlns:p="http://schemas.openxmlformats.org/presentationml/2006/main">
   <p:cSld>
     <p:spTree>
@@ -57005,6 +57046,165 @@
     <p:extLst>
       <p:ext uri="{BB962C8B-B14F-4D97-AF65-F5344CB8AC3E}">
         <p14:creationId xmlns:p14="http://schemas.microsoft.com/office/powerpoint/2010/main" val="3928208760"/>
+      </p:ext>
+    </p:extLst>
+  </p:cSld>
+  <p:clrMapOvr>
+    <a:masterClrMapping/>
+  </p:clrMapOvr>
+  <p:transition spd="med">
+    <p:push dir="u"/>
+  </p:transition>
+</p:sld>
+</file>
+
+<file path=ppt/slides/slide4.xml><?xml version="1.0" encoding="utf-8"?>
+<p:sld xmlns:a="http://schemas.openxmlformats.org/drawingml/2006/main" xmlns:r="http://schemas.openxmlformats.org/officeDocument/2006/relationships" xmlns:p="http://schemas.openxmlformats.org/presentationml/2006/main">
+  <p:cSld>
+    <p:spTree>
+      <p:nvGrpSpPr>
+        <p:cNvPr id="1" name=""/>
+        <p:cNvGrpSpPr/>
+        <p:nvPr/>
+      </p:nvGrpSpPr>
+      <p:grpSpPr>
+        <a:xfrm>
+          <a:off x="0" y="0"/>
+          <a:ext cx="0" cy="0"/>
+          <a:chOff x="0" y="0"/>
+          <a:chExt cx="0" cy="0"/>
+        </a:xfrm>
+      </p:grpSpPr>
+      <p:sp>
+        <p:nvSpPr>
+          <p:cNvPr id="2" name="Title 1">
+            <a:extLst>
+              <a:ext uri="{FF2B5EF4-FFF2-40B4-BE49-F238E27FC236}">
+                <a16:creationId xmlns:a16="http://schemas.microsoft.com/office/drawing/2014/main" id="{988D8A34-E4C6-E148-9EA1-2BB1FC96F2E2}"/>
+              </a:ext>
+            </a:extLst>
+          </p:cNvPr>
+          <p:cNvSpPr>
+            <a:spLocks noGrp="1"/>
+          </p:cNvSpPr>
+          <p:nvPr>
+            <p:ph type="title"/>
+          </p:nvPr>
+        </p:nvSpPr>
+        <p:spPr/>
+        <p:txBody>
+          <a:bodyPr>
+            <a:normAutofit/>
+          </a:bodyPr>
+          <a:lstStyle/>
+          <a:p>
+            <a:r>
+              <a:rPr lang="en-US" sz="4800"/>
+              <a:t>Client info</a:t>
+            </a:r>
+          </a:p>
+        </p:txBody>
+      </p:sp>
+      <p:pic>
+        <p:nvPicPr>
+          <p:cNvPr id="7" name="Picture 7" descr="A close up of a logo&#10;&#10;Description generated with very high confidence">
+            <a:extLst>
+              <a:ext uri="{FF2B5EF4-FFF2-40B4-BE49-F238E27FC236}">
+                <a16:creationId xmlns:a16="http://schemas.microsoft.com/office/drawing/2014/main" id="{637E1154-2245-4340-ACC9-A4604B346BE9}"/>
+              </a:ext>
+            </a:extLst>
+          </p:cNvPr>
+          <p:cNvPicPr>
+            <a:picLocks noGrp="1" noChangeAspect="1"/>
+          </p:cNvPicPr>
+          <p:nvPr>
+            <p:ph idx="1"/>
+          </p:nvPr>
+        </p:nvPicPr>
+        <p:blipFill>
+          <a:blip r:embed="rId2"/>
+          <a:stretch>
+            <a:fillRect/>
+          </a:stretch>
+        </p:blipFill>
+        <p:spPr>
+          <a:xfrm>
+            <a:off x="2590735" y="4772464"/>
+            <a:ext cx="7021878" cy="1290758"/>
+          </a:xfrm>
+          <a:prstGeom prst="rect">
+            <a:avLst/>
+          </a:prstGeom>
+        </p:spPr>
+      </p:pic>
+      <p:sp>
+        <p:nvSpPr>
+          <p:cNvPr id="6" name="Text Placeholder 5">
+            <a:extLst>
+              <a:ext uri="{FF2B5EF4-FFF2-40B4-BE49-F238E27FC236}">
+                <a16:creationId xmlns:a16="http://schemas.microsoft.com/office/drawing/2014/main" id="{B08C1F55-8ADE-46D5-BB1E-94A5AD63C938}"/>
+              </a:ext>
+            </a:extLst>
+          </p:cNvPr>
+          <p:cNvSpPr>
+            <a:spLocks noGrp="1"/>
+          </p:cNvSpPr>
+          <p:nvPr>
+            <p:ph type="body" sz="half" idx="2"/>
+          </p:nvPr>
+        </p:nvSpPr>
+        <p:spPr>
+          <a:xfrm>
+            <a:off x="2743827" y="2566952"/>
+            <a:ext cx="6697782" cy="2006012"/>
+          </a:xfrm>
+        </p:spPr>
+        <p:txBody>
+          <a:bodyPr vert="horz" lIns="91440" tIns="45720" rIns="91440" bIns="45720" rtlCol="0" anchor="t">
+            <a:noAutofit/>
+          </a:bodyPr>
+          <a:lstStyle/>
+          <a:p>
+            <a:pPr algn="ctr"/>
+            <a:r>
+              <a:rPr lang="en-US" sz="3000"/>
+              <a:t>Local company based in Kalamazoo, MI</a:t>
+            </a:r>
+          </a:p>
+          <a:p>
+            <a:pPr algn="ctr"/>
+            <a:r>
+              <a:rPr lang="en-US" sz="3000"/>
+              <a:t> Master data management platform</a:t>
+            </a:r>
+          </a:p>
+          <a:p>
+            <a:pPr algn="ctr"/>
+            <a:r>
+              <a:rPr lang="en-US" sz="3000" dirty="0">
+                <a:solidFill>
+                  <a:schemeClr val="bg2">
+                    <a:lumMod val="50000"/>
+                  </a:schemeClr>
+                </a:solidFill>
+                <a:hlinkClick r:id="rId3"/>
+              </a:rPr>
+              <a:t>https://www.salespage.com/</a:t>
+            </a:r>
+            <a:endParaRPr lang="en-US" sz="3000">
+              <a:solidFill>
+                <a:schemeClr val="bg2">
+                  <a:lumMod val="50000"/>
+                </a:schemeClr>
+              </a:solidFill>
+            </a:endParaRPr>
+          </a:p>
+        </p:txBody>
+      </p:sp>
+    </p:spTree>
+    <p:extLst>
+      <p:ext uri="{BB962C8B-B14F-4D97-AF65-F5344CB8AC3E}">
+        <p14:creationId xmlns:p14="http://schemas.microsoft.com/office/powerpoint/2010/main" val="1062428199"/>
       </p:ext>
     </p:extLst>
   </p:cSld>

</xml_diff>